<commit_message>
typescript vs javascript paper complete
</commit_message>
<xml_diff>
--- a/Software Project Management(CSE803)/payment_gateway/requirement.pptx
+++ b/Software Project Management(CSE803)/payment_gateway/requirement.pptx
@@ -216,7 +216,7 @@
           <a:p>
             <a:fld id="{2EF6CB78-1097-426E-8C7C-2604182960C7}" type="datetimeFigureOut">
               <a:rPr lang="en-US" smtClean="0"/>
-              <a:t>9/12/2019</a:t>
+              <a:t>9/17/2019</a:t>
             </a:fld>
             <a:endParaRPr lang="en-US"/>
           </a:p>
@@ -622,7 +622,7 @@
           <a:p>
             <a:fld id="{F404F80A-5777-40E1-BA24-22C4C3E777BA}" type="datetime1">
               <a:rPr lang="en-US" smtClean="0"/>
-              <a:t>9/12/2019</a:t>
+              <a:t>9/17/2019</a:t>
             </a:fld>
             <a:endParaRPr lang="en-US"/>
           </a:p>
@@ -833,7 +833,7 @@
           <a:p>
             <a:fld id="{3C3F922E-0C8A-4148-8F16-099EDA68E911}" type="datetime1">
               <a:rPr lang="en-US" smtClean="0"/>
-              <a:t>9/12/2019</a:t>
+              <a:t>9/17/2019</a:t>
             </a:fld>
             <a:endParaRPr lang="en-US"/>
           </a:p>
@@ -1048,7 +1048,7 @@
           <a:p>
             <a:fld id="{9528E524-65AA-493B-B493-F6CC9C0B35DD}" type="datetime1">
               <a:rPr lang="en-US" smtClean="0"/>
-              <a:t>9/12/2019</a:t>
+              <a:t>9/17/2019</a:t>
             </a:fld>
             <a:endParaRPr lang="en-US"/>
           </a:p>
@@ -1249,7 +1249,7 @@
           <a:p>
             <a:fld id="{88370471-0F01-4AE7-B127-CE9EC4DFB706}" type="datetime1">
               <a:rPr lang="en-US" smtClean="0"/>
-              <a:t>9/12/2019</a:t>
+              <a:t>9/17/2019</a:t>
             </a:fld>
             <a:endParaRPr lang="en-US"/>
           </a:p>
@@ -1528,7 +1528,7 @@
           <a:p>
             <a:fld id="{27A1FA46-4421-42EC-A4A2-B914EEA0B134}" type="datetime1">
               <a:rPr lang="en-US" smtClean="0"/>
-              <a:t>9/12/2019</a:t>
+              <a:t>9/17/2019</a:t>
             </a:fld>
             <a:endParaRPr lang="en-US"/>
           </a:p>
@@ -1796,7 +1796,7 @@
           <a:p>
             <a:fld id="{272846A8-0C75-44CE-8648-4095C0C39162}" type="datetime1">
               <a:rPr lang="en-US" smtClean="0"/>
-              <a:t>9/12/2019</a:t>
+              <a:t>9/17/2019</a:t>
             </a:fld>
             <a:endParaRPr lang="en-US"/>
           </a:p>
@@ -2212,7 +2212,7 @@
           <a:p>
             <a:fld id="{09902209-6E5F-4F29-9133-3163DEB67464}" type="datetime1">
               <a:rPr lang="en-US" smtClean="0"/>
-              <a:t>9/12/2019</a:t>
+              <a:t>9/17/2019</a:t>
             </a:fld>
             <a:endParaRPr lang="en-US"/>
           </a:p>
@@ -2361,7 +2361,7 @@
           <a:p>
             <a:fld id="{FAA2203A-9BBA-413F-8E47-D21B2E6FDA2C}" type="datetime1">
               <a:rPr lang="en-US" smtClean="0"/>
-              <a:t>9/12/2019</a:t>
+              <a:t>9/17/2019</a:t>
             </a:fld>
             <a:endParaRPr lang="en-US"/>
           </a:p>
@@ -2487,7 +2487,7 @@
           <a:p>
             <a:fld id="{DB277ED0-2404-4E00-BD7B-52946278BDD6}" type="datetime1">
               <a:rPr lang="en-US" smtClean="0"/>
-              <a:t>9/12/2019</a:t>
+              <a:t>9/17/2019</a:t>
             </a:fld>
             <a:endParaRPr lang="en-US"/>
           </a:p>
@@ -2738,7 +2738,7 @@
           <a:p>
             <a:fld id="{A9F38DD7-8EA2-4610-BD86-062FF789449C}" type="datetime1">
               <a:rPr lang="en-US" smtClean="0"/>
-              <a:t>9/12/2019</a:t>
+              <a:t>9/17/2019</a:t>
             </a:fld>
             <a:endParaRPr lang="en-US"/>
           </a:p>
@@ -3183,7 +3183,7 @@
           <a:p>
             <a:fld id="{2CFD3287-7151-410F-8C45-01C967729529}" type="datetime1">
               <a:rPr lang="en-US" smtClean="0"/>
-              <a:t>9/12/2019</a:t>
+              <a:t>9/17/2019</a:t>
             </a:fld>
             <a:endParaRPr lang="en-US"/>
           </a:p>
@@ -3510,7 +3510,7 @@
           <a:p>
             <a:fld id="{7D52D4D8-6B86-4373-AC00-06146CE81612}" type="datetime1">
               <a:rPr lang="en-US" smtClean="0"/>
-              <a:t>9/12/2019</a:t>
+              <a:t>9/17/2019</a:t>
             </a:fld>
             <a:endParaRPr lang="en-US"/>
           </a:p>
@@ -4066,7 +4066,7 @@
         </p:spPr>
         <p:txBody>
           <a:bodyPr>
-            <a:normAutofit fontScale="47500" lnSpcReduction="20000"/>
+            <a:normAutofit fontScale="55000" lnSpcReduction="20000"/>
           </a:bodyPr>
           <a:lstStyle/>
           <a:p>
@@ -4077,14 +4077,12 @@
           </a:p>
           <a:p>
             <a:r>
+              <a:rPr lang="en-US" sz="2900"/>
+              <a:t>Tulshi </a:t>
+            </a:r>
+            <a:r>
               <a:rPr lang="en-US" sz="2900" dirty="0"/>
-              <a:t>Iftekhar Jamil(0802)</a:t>
-            </a:r>
-          </a:p>
-          <a:p>
-            <a:r>
-              <a:rPr lang="en-US" sz="2900" dirty="0"/>
-              <a:t>Tulshi Chandra Das(0811)</a:t>
+              <a:t>Chandra Das(0811)</a:t>
             </a:r>
           </a:p>
           <a:p>

</xml_diff>